<commit_message>
Stripped away mongoDB and Service Bus stuff
</commit_message>
<xml_diff>
--- a/presentation/NodeJSPlusAzure.pptx
+++ b/presentation/NodeJSPlusAzure.pptx
@@ -5,10 +5,10 @@
     <p:sldMasterId id="2147483648" r:id="rId1"/>
   </p:sldMasterIdLst>
   <p:notesMasterIdLst>
-    <p:notesMasterId r:id="rId11"/>
+    <p:notesMasterId r:id="rId12"/>
   </p:notesMasterIdLst>
   <p:handoutMasterIdLst>
-    <p:handoutMasterId r:id="rId12"/>
+    <p:handoutMasterId r:id="rId13"/>
   </p:handoutMasterIdLst>
   <p:sldIdLst>
     <p:sldId id="281" r:id="rId2"/>
@@ -19,7 +19,8 @@
     <p:sldId id="309" r:id="rId7"/>
     <p:sldId id="292" r:id="rId8"/>
     <p:sldId id="312" r:id="rId9"/>
-    <p:sldId id="296" r:id="rId10"/>
+    <p:sldId id="313" r:id="rId10"/>
+    <p:sldId id="296" r:id="rId11"/>
   </p:sldIdLst>
   <p:sldSz cx="9144000" cy="6858000" type="screen4x3"/>
   <p:notesSz cx="6797675" cy="9926638"/>
@@ -219,7 +220,7 @@
           <a:p>
             <a:fld id="{0CBC7E5D-2249-4AED-8E07-5BC47B95A802}" type="datetimeFigureOut">
               <a:rPr lang="nb-NO" smtClean="0"/>
-              <a:t>20.05.2015</a:t>
+              <a:t>22.05.2015</a:t>
             </a:fld>
             <a:endParaRPr lang="nb-NO"/>
           </a:p>
@@ -385,7 +386,7 @@
           <a:p>
             <a:fld id="{722E25F1-470E-45F2-BDE8-F9770272E8C0}" type="datetimeFigureOut">
               <a:rPr lang="nb-NO" smtClean="0"/>
-              <a:t>20.05.2015</a:t>
+              <a:t>22.05.2015</a:t>
             </a:fld>
             <a:endParaRPr lang="nb-NO"/>
           </a:p>
@@ -740,6 +741,90 @@
 </p:notes>
 </file>
 
+<file path=ppt/notesSlides/notesSlide10.xml><?xml version="1.0" encoding="utf-8"?>
+<p:notes xmlns:a="http://schemas.openxmlformats.org/drawingml/2006/main" xmlns:r="http://schemas.openxmlformats.org/officeDocument/2006/relationships" xmlns:p="http://schemas.openxmlformats.org/presentationml/2006/main">
+  <p:cSld>
+    <p:spTree>
+      <p:nvGrpSpPr>
+        <p:cNvPr id="1" name=""/>
+        <p:cNvGrpSpPr/>
+        <p:nvPr/>
+      </p:nvGrpSpPr>
+      <p:grpSpPr>
+        <a:xfrm>
+          <a:off x="0" y="0"/>
+          <a:ext cx="0" cy="0"/>
+          <a:chOff x="0" y="0"/>
+          <a:chExt cx="0" cy="0"/>
+        </a:xfrm>
+      </p:grpSpPr>
+      <p:sp>
+        <p:nvSpPr>
+          <p:cNvPr id="2" name="Slide Image Placeholder 1"/>
+          <p:cNvSpPr>
+            <a:spLocks noGrp="1" noRot="1" noChangeAspect="1"/>
+          </p:cNvSpPr>
+          <p:nvPr>
+            <p:ph type="sldImg"/>
+          </p:nvPr>
+        </p:nvSpPr>
+        <p:spPr/>
+      </p:sp>
+      <p:sp>
+        <p:nvSpPr>
+          <p:cNvPr id="3" name="Notes Placeholder 2"/>
+          <p:cNvSpPr>
+            <a:spLocks noGrp="1"/>
+          </p:cNvSpPr>
+          <p:nvPr>
+            <p:ph type="body" idx="1"/>
+          </p:nvPr>
+        </p:nvSpPr>
+        <p:spPr/>
+        <p:txBody>
+          <a:bodyPr/>
+          <a:lstStyle/>
+          <a:p>
+            <a:endParaRPr lang="en-US"/>
+          </a:p>
+        </p:txBody>
+      </p:sp>
+      <p:sp>
+        <p:nvSpPr>
+          <p:cNvPr id="4" name="Slide Number Placeholder 3"/>
+          <p:cNvSpPr>
+            <a:spLocks noGrp="1"/>
+          </p:cNvSpPr>
+          <p:nvPr>
+            <p:ph type="sldNum" sz="quarter" idx="10"/>
+          </p:nvPr>
+        </p:nvSpPr>
+        <p:spPr/>
+        <p:txBody>
+          <a:bodyPr/>
+          <a:lstStyle/>
+          <a:p>
+            <a:fld id="{73FBBA7B-2A3A-4FBD-B86D-72CEFE9BC3F8}" type="slidenum">
+              <a:rPr lang="nb-NO" smtClean="0"/>
+              <a:t>10</a:t>
+            </a:fld>
+            <a:endParaRPr lang="nb-NO"/>
+          </a:p>
+        </p:txBody>
+      </p:sp>
+    </p:spTree>
+    <p:extLst>
+      <p:ext uri="{BB962C8B-B14F-4D97-AF65-F5344CB8AC3E}">
+        <p14:creationId xmlns:p14="http://schemas.microsoft.com/office/powerpoint/2010/main" val="486209378"/>
+      </p:ext>
+    </p:extLst>
+  </p:cSld>
+  <p:clrMapOvr>
+    <a:masterClrMapping/>
+  </p:clrMapOvr>
+</p:notes>
+</file>
+
 <file path=ppt/notesSlides/notesSlide2.xml><?xml version="1.0" encoding="utf-8"?>
 <p:notes xmlns:a="http://schemas.openxmlformats.org/drawingml/2006/main" xmlns:r="http://schemas.openxmlformats.org/officeDocument/2006/relationships" xmlns:p="http://schemas.openxmlformats.org/presentationml/2006/main">
   <p:cSld>
@@ -1423,7 +1508,7 @@
     </p:spTree>
     <p:extLst>
       <p:ext uri="{BB962C8B-B14F-4D97-AF65-F5344CB8AC3E}">
-        <p14:creationId xmlns:p14="http://schemas.microsoft.com/office/powerpoint/2010/main" val="486209378"/>
+        <p14:creationId xmlns:p14="http://schemas.microsoft.com/office/powerpoint/2010/main" val="3527094135"/>
       </p:ext>
     </p:extLst>
   </p:cSld>
@@ -1614,7 +1699,7 @@
           <a:p>
             <a:fld id="{9FCAED78-9B1A-483A-9B1B-976707F2AD05}" type="datetime1">
               <a:rPr lang="nb-NO" smtClean="0"/>
-              <a:t>20.05.2015</a:t>
+              <a:t>22.05.2015</a:t>
             </a:fld>
             <a:endParaRPr lang="nb-NO"/>
           </a:p>
@@ -1780,7 +1865,7 @@
           <a:p>
             <a:fld id="{2CBBA29D-DCB3-4D6A-8FF9-9521621F4D68}" type="datetime1">
               <a:rPr lang="nb-NO" smtClean="0"/>
-              <a:t>20.05.2015</a:t>
+              <a:t>22.05.2015</a:t>
             </a:fld>
             <a:endParaRPr lang="nb-NO"/>
           </a:p>
@@ -1956,7 +2041,7 @@
           <a:p>
             <a:fld id="{AEDA6C7C-83A1-4492-8FF4-982D2ED4C04F}" type="datetime1">
               <a:rPr lang="nb-NO" smtClean="0"/>
-              <a:t>20.05.2015</a:t>
+              <a:t>22.05.2015</a:t>
             </a:fld>
             <a:endParaRPr lang="nb-NO"/>
           </a:p>
@@ -2122,7 +2207,7 @@
           <a:p>
             <a:fld id="{B7E0B184-7883-4314-A57C-F6BA6A1F0E96}" type="datetime1">
               <a:rPr lang="nb-NO" smtClean="0"/>
-              <a:t>20.05.2015</a:t>
+              <a:t>22.05.2015</a:t>
             </a:fld>
             <a:endParaRPr lang="nb-NO"/>
           </a:p>
@@ -2364,7 +2449,7 @@
           <a:p>
             <a:fld id="{999DBB36-912D-4AC3-8E4A-8138E4BF6D07}" type="datetime1">
               <a:rPr lang="nb-NO" smtClean="0"/>
-              <a:t>20.05.2015</a:t>
+              <a:t>22.05.2015</a:t>
             </a:fld>
             <a:endParaRPr lang="nb-NO"/>
           </a:p>
@@ -2648,7 +2733,7 @@
           <a:p>
             <a:fld id="{EF87DAEE-1FC3-4EE4-9B01-B4921EC45746}" type="datetime1">
               <a:rPr lang="nb-NO" smtClean="0"/>
-              <a:t>20.05.2015</a:t>
+              <a:t>22.05.2015</a:t>
             </a:fld>
             <a:endParaRPr lang="nb-NO"/>
           </a:p>
@@ -3066,7 +3151,7 @@
           <a:p>
             <a:fld id="{2F5B0EBD-1E63-4BDE-B899-EAD8851A472F}" type="datetime1">
               <a:rPr lang="nb-NO" smtClean="0"/>
-              <a:t>20.05.2015</a:t>
+              <a:t>22.05.2015</a:t>
             </a:fld>
             <a:endParaRPr lang="nb-NO"/>
           </a:p>
@@ -3180,7 +3265,7 @@
           <a:p>
             <a:fld id="{E2F60948-72DA-44D0-8524-3E1358F9FC74}" type="datetime1">
               <a:rPr lang="nb-NO" smtClean="0"/>
-              <a:t>20.05.2015</a:t>
+              <a:t>22.05.2015</a:t>
             </a:fld>
             <a:endParaRPr lang="nb-NO"/>
           </a:p>
@@ -3271,7 +3356,7 @@
           <a:p>
             <a:fld id="{13BEA338-0646-40DD-886F-46BFE567A42E}" type="datetime1">
               <a:rPr lang="nb-NO" smtClean="0"/>
-              <a:t>20.05.2015</a:t>
+              <a:t>22.05.2015</a:t>
             </a:fld>
             <a:endParaRPr lang="nb-NO"/>
           </a:p>
@@ -3544,7 +3629,7 @@
           <a:p>
             <a:fld id="{2697EE21-1D9F-4E1B-A9A1-87737555180A}" type="datetime1">
               <a:rPr lang="nb-NO" smtClean="0"/>
-              <a:t>20.05.2015</a:t>
+              <a:t>22.05.2015</a:t>
             </a:fld>
             <a:endParaRPr lang="nb-NO"/>
           </a:p>
@@ -3793,7 +3878,7 @@
           <a:p>
             <a:fld id="{14650A92-F75F-4514-BF07-9FDF15A8E1CD}" type="datetime1">
               <a:rPr lang="nb-NO" smtClean="0"/>
-              <a:t>20.05.2015</a:t>
+              <a:t>22.05.2015</a:t>
             </a:fld>
             <a:endParaRPr lang="nb-NO"/>
           </a:p>
@@ -4008,7 +4093,7 @@
           <a:p>
             <a:fld id="{73C2417E-40D5-4760-B16F-80E9592E5DDC}" type="datetime1">
               <a:rPr lang="nb-NO" smtClean="0"/>
-              <a:t>20.05.2015</a:t>
+              <a:t>22.05.2015</a:t>
             </a:fld>
             <a:endParaRPr lang="nb-NO"/>
           </a:p>
@@ -4557,6 +4642,446 @@
     <p:extLst>
       <p:ext uri="{BB962C8B-B14F-4D97-AF65-F5344CB8AC3E}">
         <p14:creationId xmlns:p14="http://schemas.microsoft.com/office/powerpoint/2010/main" val="1339808210"/>
+      </p:ext>
+    </p:extLst>
+  </p:cSld>
+  <p:clrMapOvr>
+    <a:masterClrMapping/>
+  </p:clrMapOvr>
+  <p:timing>
+    <p:tnLst>
+      <p:par>
+        <p:cTn id="1" dur="indefinite" restart="never" nodeType="tmRoot"/>
+      </p:par>
+    </p:tnLst>
+  </p:timing>
+</p:sld>
+</file>
+
+<file path=ppt/slides/slide10.xml><?xml version="1.0" encoding="utf-8"?>
+<p:sld xmlns:a="http://schemas.openxmlformats.org/drawingml/2006/main" xmlns:r="http://schemas.openxmlformats.org/officeDocument/2006/relationships" xmlns:p="http://schemas.openxmlformats.org/presentationml/2006/main">
+  <p:cSld>
+    <p:bg>
+      <p:bgPr>
+        <a:solidFill>
+          <a:schemeClr val="tx1"/>
+        </a:solidFill>
+        <a:effectLst/>
+      </p:bgPr>
+    </p:bg>
+    <p:spTree>
+      <p:nvGrpSpPr>
+        <p:cNvPr id="1" name=""/>
+        <p:cNvGrpSpPr/>
+        <p:nvPr/>
+      </p:nvGrpSpPr>
+      <p:grpSpPr>
+        <a:xfrm>
+          <a:off x="0" y="0"/>
+          <a:ext cx="0" cy="0"/>
+          <a:chOff x="0" y="0"/>
+          <a:chExt cx="0" cy="0"/>
+        </a:xfrm>
+      </p:grpSpPr>
+      <p:sp>
+        <p:nvSpPr>
+          <p:cNvPr id="4" name="TextBox 3"/>
+          <p:cNvSpPr txBox="1"/>
+          <p:nvPr/>
+        </p:nvSpPr>
+        <p:spPr>
+          <a:xfrm>
+            <a:off x="4003261" y="6486340"/>
+            <a:ext cx="5147563" cy="369332"/>
+          </a:xfrm>
+          <a:prstGeom prst="rect">
+            <a:avLst/>
+          </a:prstGeom>
+          <a:noFill/>
+        </p:spPr>
+        <p:txBody>
+          <a:bodyPr wrap="none" rtlCol="0">
+            <a:spAutoFit/>
+          </a:bodyPr>
+          <a:lstStyle/>
+          <a:p>
+            <a:r>
+              <a:rPr lang="nb-NO" b="1" dirty="0">
+                <a:latin typeface="Courier New" panose="02070309020205020404" pitchFamily="49" charset="0"/>
+                <a:cs typeface="Courier New" panose="02070309020205020404" pitchFamily="49" charset="0"/>
+              </a:rPr>
+              <a:t>https://github.com/magnushg/automatr</a:t>
+            </a:r>
+          </a:p>
+        </p:txBody>
+      </p:sp>
+      <p:pic>
+        <p:nvPicPr>
+          <p:cNvPr id="5" name="Bilde 4"/>
+          <p:cNvPicPr>
+            <a:picLocks noChangeAspect="1"/>
+          </p:cNvPicPr>
+          <p:nvPr/>
+        </p:nvPicPr>
+        <p:blipFill>
+          <a:blip r:embed="rId3" cstate="print">
+            <a:extLst>
+              <a:ext uri="{28A0092B-C50C-407E-A947-70E740481C1C}">
+                <a14:useLocalDpi xmlns:a14="http://schemas.microsoft.com/office/drawing/2010/main" val="0"/>
+              </a:ext>
+            </a:extLst>
+          </a:blip>
+          <a:stretch>
+            <a:fillRect/>
+          </a:stretch>
+        </p:blipFill>
+        <p:spPr>
+          <a:xfrm>
+            <a:off x="7596336" y="6237312"/>
+            <a:ext cx="1622128" cy="557564"/>
+          </a:xfrm>
+          <a:prstGeom prst="rect">
+            <a:avLst/>
+          </a:prstGeom>
+        </p:spPr>
+      </p:pic>
+      <p:pic>
+        <p:nvPicPr>
+          <p:cNvPr id="6" name="Bilde 5"/>
+          <p:cNvPicPr>
+            <a:picLocks noChangeAspect="1"/>
+          </p:cNvPicPr>
+          <p:nvPr/>
+        </p:nvPicPr>
+        <p:blipFill>
+          <a:blip r:embed="rId4" cstate="print">
+            <a:extLst>
+              <a:ext uri="{28A0092B-C50C-407E-A947-70E740481C1C}">
+                <a14:useLocalDpi xmlns:a14="http://schemas.microsoft.com/office/drawing/2010/main" val="0"/>
+              </a:ext>
+            </a:extLst>
+          </a:blip>
+          <a:stretch>
+            <a:fillRect/>
+          </a:stretch>
+        </p:blipFill>
+        <p:spPr>
+          <a:xfrm>
+            <a:off x="5436096" y="1916832"/>
+            <a:ext cx="3528392" cy="3528392"/>
+          </a:xfrm>
+          <a:prstGeom prst="rect">
+            <a:avLst/>
+          </a:prstGeom>
+        </p:spPr>
+      </p:pic>
+      <p:sp>
+        <p:nvSpPr>
+          <p:cNvPr id="8" name="Title 1"/>
+          <p:cNvSpPr>
+            <a:spLocks noGrp="1"/>
+          </p:cNvSpPr>
+          <p:nvPr>
+            <p:ph type="title"/>
+          </p:nvPr>
+        </p:nvSpPr>
+        <p:spPr/>
+        <p:txBody>
+          <a:bodyPr>
+            <a:normAutofit/>
+          </a:bodyPr>
+          <a:lstStyle/>
+          <a:p>
+            <a:r>
+              <a:rPr lang="nb-NO" sz="5400" dirty="0" err="1">
+                <a:solidFill>
+                  <a:srgbClr val="33EA14"/>
+                </a:solidFill>
+                <a:latin typeface="Courier New" panose="02070309020205020404" pitchFamily="49" charset="0"/>
+                <a:cs typeface="Courier New" panose="02070309020205020404" pitchFamily="49" charset="0"/>
+              </a:rPr>
+              <a:t>w</a:t>
+            </a:r>
+            <a:r>
+              <a:rPr lang="nb-NO" sz="5400" dirty="0" err="1" smtClean="0">
+                <a:solidFill>
+                  <a:srgbClr val="33EA14"/>
+                </a:solidFill>
+                <a:latin typeface="Courier New" panose="02070309020205020404" pitchFamily="49" charset="0"/>
+                <a:cs typeface="Courier New" panose="02070309020205020404" pitchFamily="49" charset="0"/>
+              </a:rPr>
+              <a:t>ant</a:t>
+            </a:r>
+            <a:r>
+              <a:rPr lang="nb-NO" sz="5400" dirty="0" smtClean="0">
+                <a:solidFill>
+                  <a:srgbClr val="33EA14"/>
+                </a:solidFill>
+                <a:latin typeface="Courier New" panose="02070309020205020404" pitchFamily="49" charset="0"/>
+                <a:cs typeface="Courier New" panose="02070309020205020404" pitchFamily="49" charset="0"/>
+              </a:rPr>
+              <a:t> more?</a:t>
+            </a:r>
+            <a:endParaRPr lang="nb-NO" sz="5400" dirty="0">
+              <a:solidFill>
+                <a:srgbClr val="33EA14"/>
+              </a:solidFill>
+              <a:latin typeface="Courier New" panose="02070309020205020404" pitchFamily="49" charset="0"/>
+              <a:cs typeface="Courier New" panose="02070309020205020404" pitchFamily="49" charset="0"/>
+            </a:endParaRPr>
+          </a:p>
+        </p:txBody>
+      </p:sp>
+      <p:sp>
+        <p:nvSpPr>
+          <p:cNvPr id="7" name="Content Placeholder 2"/>
+          <p:cNvSpPr>
+            <a:spLocks noGrp="1"/>
+          </p:cNvSpPr>
+          <p:nvPr>
+            <p:ph idx="1"/>
+          </p:nvPr>
+        </p:nvSpPr>
+        <p:spPr>
+          <a:xfrm>
+            <a:off x="323528" y="1844824"/>
+            <a:ext cx="4968552" cy="4591910"/>
+          </a:xfrm>
+        </p:spPr>
+        <p:txBody>
+          <a:bodyPr vert="horz" lIns="91440" tIns="45720" rIns="91440" bIns="45720" rtlCol="0" anchor="t">
+            <a:normAutofit/>
+          </a:bodyPr>
+          <a:lstStyle/>
+          <a:p>
+            <a:pPr>
+              <a:buFont typeface="Wingdings" panose="05000000000000000000" pitchFamily="2" charset="2"/>
+              <a:buChar char="§"/>
+            </a:pPr>
+            <a:r>
+              <a:rPr lang="nb-NO" sz="2800" dirty="0" smtClean="0">
+                <a:solidFill>
+                  <a:schemeClr val="bg1">
+                    <a:lumMod val="95000"/>
+                  </a:schemeClr>
+                </a:solidFill>
+                <a:latin typeface="Courier New" panose="02070309020205020404" pitchFamily="49" charset="0"/>
+                <a:cs typeface="Courier New" panose="02070309020205020404" pitchFamily="49" charset="0"/>
+              </a:rPr>
+              <a:t>Code </a:t>
+            </a:r>
+            <a:r>
+              <a:rPr lang="nb-NO" sz="2800" dirty="0" err="1" smtClean="0">
+                <a:solidFill>
+                  <a:schemeClr val="bg1">
+                    <a:lumMod val="95000"/>
+                  </a:schemeClr>
+                </a:solidFill>
+                <a:latin typeface="Courier New" panose="02070309020205020404" pitchFamily="49" charset="0"/>
+                <a:cs typeface="Courier New" panose="02070309020205020404" pitchFamily="49" charset="0"/>
+              </a:rPr>
+              <a:t>available</a:t>
+            </a:r>
+            <a:r>
+              <a:rPr lang="nb-NO" sz="2800" dirty="0" smtClean="0">
+                <a:solidFill>
+                  <a:schemeClr val="bg1">
+                    <a:lumMod val="95000"/>
+                  </a:schemeClr>
+                </a:solidFill>
+                <a:latin typeface="Courier New" panose="02070309020205020404" pitchFamily="49" charset="0"/>
+                <a:cs typeface="Courier New" panose="02070309020205020404" pitchFamily="49" charset="0"/>
+              </a:rPr>
+              <a:t> at </a:t>
+            </a:r>
+            <a:r>
+              <a:rPr lang="nb-NO" sz="2800" dirty="0" err="1" smtClean="0">
+                <a:solidFill>
+                  <a:schemeClr val="bg1">
+                    <a:lumMod val="95000"/>
+                  </a:schemeClr>
+                </a:solidFill>
+                <a:latin typeface="Courier New" panose="02070309020205020404" pitchFamily="49" charset="0"/>
+                <a:cs typeface="Courier New" panose="02070309020205020404" pitchFamily="49" charset="0"/>
+              </a:rPr>
+              <a:t>github</a:t>
+            </a:r>
+            <a:r>
+              <a:rPr lang="nb-NO" sz="2800" dirty="0" smtClean="0">
+                <a:solidFill>
+                  <a:schemeClr val="bg1">
+                    <a:lumMod val="95000"/>
+                  </a:schemeClr>
+                </a:solidFill>
+                <a:latin typeface="Courier New" panose="02070309020205020404" pitchFamily="49" charset="0"/>
+                <a:cs typeface="Courier New" panose="02070309020205020404" pitchFamily="49" charset="0"/>
+              </a:rPr>
+              <a:t>, </a:t>
+            </a:r>
+            <a:r>
+              <a:rPr lang="nb-NO" sz="2800" dirty="0">
+                <a:solidFill>
+                  <a:srgbClr val="D99694"/>
+                </a:solidFill>
+                <a:latin typeface="Courier New" panose="02070309020205020404" pitchFamily="49" charset="0"/>
+                <a:cs typeface="Courier New" panose="02070309020205020404" pitchFamily="49" charset="0"/>
+                <a:hlinkClick r:id="rId5"/>
+              </a:rPr>
+              <a:t>https://</a:t>
+            </a:r>
+            <a:r>
+              <a:rPr lang="nb-NO" sz="2800" dirty="0" smtClean="0">
+                <a:solidFill>
+                  <a:srgbClr val="D99694"/>
+                </a:solidFill>
+                <a:latin typeface="Courier New" panose="02070309020205020404" pitchFamily="49" charset="0"/>
+                <a:cs typeface="Courier New" panose="02070309020205020404" pitchFamily="49" charset="0"/>
+                <a:hlinkClick r:id="rId5"/>
+              </a:rPr>
+              <a:t>github.com/magnushg/NodeConfOneShotOslo</a:t>
+            </a:r>
+            <a:endParaRPr lang="nb-NO" sz="2800" dirty="0" smtClean="0">
+              <a:solidFill>
+                <a:srgbClr val="D99694"/>
+              </a:solidFill>
+              <a:latin typeface="Courier New" panose="02070309020205020404" pitchFamily="49" charset="0"/>
+              <a:cs typeface="Courier New" panose="02070309020205020404" pitchFamily="49" charset="0"/>
+            </a:endParaRPr>
+          </a:p>
+          <a:p>
+            <a:pPr>
+              <a:buFont typeface="Wingdings" panose="05000000000000000000" pitchFamily="2" charset="2"/>
+              <a:buChar char="§"/>
+            </a:pPr>
+            <a:r>
+              <a:rPr lang="nb-NO" sz="2800" dirty="0" err="1" smtClean="0">
+                <a:solidFill>
+                  <a:schemeClr val="bg1">
+                    <a:lumMod val="95000"/>
+                  </a:schemeClr>
+                </a:solidFill>
+                <a:latin typeface="Courier New" panose="02070309020205020404" pitchFamily="49" charset="0"/>
+                <a:cs typeface="Courier New" panose="02070309020205020404" pitchFamily="49" charset="0"/>
+              </a:rPr>
+              <a:t>Contact</a:t>
+            </a:r>
+            <a:r>
+              <a:rPr lang="nb-NO" sz="2800" dirty="0" smtClean="0">
+                <a:solidFill>
+                  <a:schemeClr val="bg1">
+                    <a:lumMod val="95000"/>
+                  </a:schemeClr>
+                </a:solidFill>
+                <a:latin typeface="Courier New" panose="02070309020205020404" pitchFamily="49" charset="0"/>
+                <a:cs typeface="Courier New" panose="02070309020205020404" pitchFamily="49" charset="0"/>
+              </a:rPr>
+              <a:t> </a:t>
+            </a:r>
+            <a:r>
+              <a:rPr lang="nb-NO" sz="2800" dirty="0" err="1" smtClean="0">
+                <a:solidFill>
+                  <a:schemeClr val="bg1">
+                    <a:lumMod val="95000"/>
+                  </a:schemeClr>
+                </a:solidFill>
+                <a:latin typeface="Courier New" panose="02070309020205020404" pitchFamily="49" charset="0"/>
+                <a:cs typeface="Courier New" panose="02070309020205020404" pitchFamily="49" charset="0"/>
+              </a:rPr>
+              <a:t>me</a:t>
+            </a:r>
+            <a:r>
+              <a:rPr lang="nb-NO" sz="2800" dirty="0" smtClean="0">
+                <a:solidFill>
+                  <a:schemeClr val="bg1">
+                    <a:lumMod val="95000"/>
+                  </a:schemeClr>
+                </a:solidFill>
+                <a:latin typeface="Courier New" panose="02070309020205020404" pitchFamily="49" charset="0"/>
+                <a:cs typeface="Courier New" panose="02070309020205020404" pitchFamily="49" charset="0"/>
+              </a:rPr>
+              <a:t> at </a:t>
+            </a:r>
+            <a:r>
+              <a:rPr lang="nb-NO" sz="2800" dirty="0">
+                <a:solidFill>
+                  <a:srgbClr val="33EA14"/>
+                </a:solidFill>
+                <a:latin typeface="Courier New" panose="02070309020205020404" pitchFamily="49" charset="0"/>
+                <a:cs typeface="Courier New" panose="02070309020205020404" pitchFamily="49" charset="0"/>
+                <a:hlinkClick r:id="rId6"/>
+              </a:rPr>
+              <a:t>magnus.green@bouvet.no</a:t>
+            </a:r>
+            <a:r>
+              <a:rPr lang="nb-NO" sz="2800" dirty="0" smtClean="0">
+                <a:solidFill>
+                  <a:schemeClr val="bg1">
+                    <a:lumMod val="95000"/>
+                  </a:schemeClr>
+                </a:solidFill>
+                <a:latin typeface="Courier New" panose="02070309020205020404" pitchFamily="49" charset="0"/>
+                <a:cs typeface="Courier New" panose="02070309020205020404" pitchFamily="49" charset="0"/>
+              </a:rPr>
+              <a:t> or @</a:t>
+            </a:r>
+            <a:r>
+              <a:rPr lang="nb-NO" sz="2800" dirty="0" err="1" smtClean="0">
+                <a:solidFill>
+                  <a:schemeClr val="bg1">
+                    <a:lumMod val="95000"/>
+                  </a:schemeClr>
+                </a:solidFill>
+                <a:latin typeface="Courier New" panose="02070309020205020404" pitchFamily="49" charset="0"/>
+                <a:cs typeface="Courier New" panose="02070309020205020404" pitchFamily="49" charset="0"/>
+              </a:rPr>
+              <a:t>magnusg</a:t>
+            </a:r>
+            <a:endParaRPr lang="nb-NO" sz="2800" dirty="0" smtClean="0">
+              <a:solidFill>
+                <a:schemeClr val="bg1">
+                  <a:lumMod val="95000"/>
+                </a:schemeClr>
+              </a:solidFill>
+              <a:latin typeface="Courier New" panose="02070309020205020404" pitchFamily="49" charset="0"/>
+              <a:cs typeface="Courier New" panose="02070309020205020404" pitchFamily="49" charset="0"/>
+            </a:endParaRPr>
+          </a:p>
+          <a:p>
+            <a:pPr>
+              <a:buFont typeface="Wingdings" panose="05000000000000000000" pitchFamily="2" charset="2"/>
+              <a:buChar char="§"/>
+            </a:pPr>
+            <a:endParaRPr lang="nb-NO" sz="3600" dirty="0">
+              <a:solidFill>
+                <a:schemeClr val="bg1">
+                  <a:lumMod val="95000"/>
+                </a:schemeClr>
+              </a:solidFill>
+              <a:latin typeface="Courier New" panose="02070309020205020404" pitchFamily="49" charset="0"/>
+              <a:cs typeface="Courier New" panose="02070309020205020404" pitchFamily="49" charset="0"/>
+            </a:endParaRPr>
+          </a:p>
+          <a:p>
+            <a:pPr>
+              <a:buFont typeface="Wingdings" panose="05000000000000000000" pitchFamily="2" charset="2"/>
+              <a:buChar char="§"/>
+            </a:pPr>
+            <a:endParaRPr lang="nb-NO" sz="3600" dirty="0">
+              <a:solidFill>
+                <a:schemeClr val="bg1">
+                  <a:lumMod val="95000"/>
+                </a:schemeClr>
+              </a:solidFill>
+              <a:latin typeface="Courier New" panose="02070309020205020404" pitchFamily="49" charset="0"/>
+              <a:cs typeface="Courier New" panose="02070309020205020404" pitchFamily="49" charset="0"/>
+            </a:endParaRPr>
+          </a:p>
+        </p:txBody>
+      </p:sp>
+    </p:spTree>
+    <p:extLst>
+      <p:ext uri="{BB962C8B-B14F-4D97-AF65-F5344CB8AC3E}">
+        <p14:creationId xmlns:p14="http://schemas.microsoft.com/office/powerpoint/2010/main" val="1381144338"/>
       </p:ext>
     </p:extLst>
   </p:cSld>
@@ -7235,17 +7760,7 @@
                 <a:latin typeface="Courier New" panose="02070309020205020404" pitchFamily="49" charset="0"/>
                 <a:cs typeface="Courier New" panose="02070309020205020404" pitchFamily="49" charset="0"/>
               </a:rPr>
-              <a:t> </a:t>
-            </a:r>
-            <a:r>
-              <a:rPr lang="nb-NO" sz="5400" dirty="0" smtClean="0">
-                <a:solidFill>
-                  <a:srgbClr val="33EA14"/>
-                </a:solidFill>
-                <a:latin typeface="Courier New" panose="02070309020205020404" pitchFamily="49" charset="0"/>
-                <a:cs typeface="Courier New" panose="02070309020205020404" pitchFamily="49" charset="0"/>
-              </a:rPr>
-              <a:t>to </a:t>
+              <a:t> to </a:t>
             </a:r>
             <a:r>
               <a:rPr lang="nb-NO" sz="5400" dirty="0" err="1" smtClean="0">
@@ -7989,39 +8504,88 @@
       </p:grpSpPr>
       <p:sp>
         <p:nvSpPr>
-          <p:cNvPr id="4" name="TextBox 3"/>
-          <p:cNvSpPr txBox="1"/>
-          <p:nvPr/>
+          <p:cNvPr id="2" name="Title 1"/>
+          <p:cNvSpPr>
+            <a:spLocks noGrp="1"/>
+          </p:cNvSpPr>
+          <p:nvPr>
+            <p:ph type="title"/>
+          </p:nvPr>
         </p:nvSpPr>
         <p:spPr>
           <a:xfrm>
-            <a:off x="4003261" y="6486340"/>
-            <a:ext cx="5147563" cy="369332"/>
+            <a:off x="539552" y="2420888"/>
+            <a:ext cx="8229600" cy="1143000"/>
           </a:xfrm>
-          <a:prstGeom prst="rect">
-            <a:avLst/>
-          </a:prstGeom>
-          <a:noFill/>
         </p:spPr>
         <p:txBody>
-          <a:bodyPr wrap="none" rtlCol="0">
-            <a:spAutoFit/>
+          <a:bodyPr>
+            <a:normAutofit fontScale="90000"/>
           </a:bodyPr>
           <a:lstStyle/>
           <a:p>
             <a:r>
-              <a:rPr lang="nb-NO" b="1" dirty="0">
-                <a:latin typeface="Courier New" panose="02070309020205020404" pitchFamily="49" charset="0"/>
-                <a:cs typeface="Courier New" panose="02070309020205020404" pitchFamily="49" charset="0"/>
-              </a:rPr>
-              <a:t>https://github.com/magnushg/automatr</a:t>
-            </a:r>
+              <a:rPr lang="nb-NO" sz="5400" dirty="0" smtClean="0">
+                <a:solidFill>
+                  <a:srgbClr val="33EA14"/>
+                </a:solidFill>
+                <a:latin typeface="Courier New" panose="02070309020205020404" pitchFamily="49" charset="0"/>
+                <a:cs typeface="Courier New" panose="02070309020205020404" pitchFamily="49" charset="0"/>
+              </a:rPr>
+              <a:t>DEMO</a:t>
+            </a:r>
+            <a:br>
+              <a:rPr lang="nb-NO" sz="5400" dirty="0" smtClean="0">
+                <a:solidFill>
+                  <a:srgbClr val="33EA14"/>
+                </a:solidFill>
+                <a:latin typeface="Courier New" panose="02070309020205020404" pitchFamily="49" charset="0"/>
+                <a:cs typeface="Courier New" panose="02070309020205020404" pitchFamily="49" charset="0"/>
+              </a:rPr>
+            </a:br>
+            <a:r>
+              <a:rPr lang="nb-NO" sz="5400" dirty="0" smtClean="0">
+                <a:solidFill>
+                  <a:srgbClr val="33EA14"/>
+                </a:solidFill>
+                <a:latin typeface="Courier New" panose="02070309020205020404" pitchFamily="49" charset="0"/>
+                <a:cs typeface="Courier New" panose="02070309020205020404" pitchFamily="49" charset="0"/>
+              </a:rPr>
+              <a:t>Debugging </a:t>
+            </a:r>
+            <a:r>
+              <a:rPr lang="nb-NO" sz="5400" dirty="0" err="1" smtClean="0">
+                <a:solidFill>
+                  <a:srgbClr val="33EA14"/>
+                </a:solidFill>
+                <a:latin typeface="Courier New" panose="02070309020205020404" pitchFamily="49" charset="0"/>
+                <a:cs typeface="Courier New" panose="02070309020205020404" pitchFamily="49" charset="0"/>
+              </a:rPr>
+              <a:t>NodeJS</a:t>
+            </a:r>
+            <a:r>
+              <a:rPr lang="nb-NO" sz="5400" dirty="0" smtClean="0">
+                <a:solidFill>
+                  <a:srgbClr val="33EA14"/>
+                </a:solidFill>
+                <a:latin typeface="Courier New" panose="02070309020205020404" pitchFamily="49" charset="0"/>
+                <a:cs typeface="Courier New" panose="02070309020205020404" pitchFamily="49" charset="0"/>
+              </a:rPr>
+              <a:t> in VS Code</a:t>
+            </a:r>
+            <a:endParaRPr lang="nb-NO" sz="5400" dirty="0">
+              <a:solidFill>
+                <a:srgbClr val="33EA14"/>
+              </a:solidFill>
+              <a:latin typeface="Courier New" panose="02070309020205020404" pitchFamily="49" charset="0"/>
+              <a:cs typeface="Courier New" panose="02070309020205020404" pitchFamily="49" charset="0"/>
+            </a:endParaRPr>
           </a:p>
         </p:txBody>
       </p:sp>
       <p:pic>
         <p:nvPicPr>
-          <p:cNvPr id="5" name="Bilde 4"/>
+          <p:cNvPr id="4" name="Bilde 3"/>
           <p:cNvPicPr>
             <a:picLocks noChangeAspect="1"/>
           </p:cNvPicPr>
@@ -8049,343 +8613,10 @@
           </a:prstGeom>
         </p:spPr>
       </p:pic>
-      <p:pic>
-        <p:nvPicPr>
-          <p:cNvPr id="6" name="Bilde 5"/>
-          <p:cNvPicPr>
-            <a:picLocks noChangeAspect="1"/>
-          </p:cNvPicPr>
-          <p:nvPr/>
-        </p:nvPicPr>
-        <p:blipFill>
-          <a:blip r:embed="rId4" cstate="print">
-            <a:extLst>
-              <a:ext uri="{28A0092B-C50C-407E-A947-70E740481C1C}">
-                <a14:useLocalDpi xmlns:a14="http://schemas.microsoft.com/office/drawing/2010/main" val="0"/>
-              </a:ext>
-            </a:extLst>
-          </a:blip>
-          <a:stretch>
-            <a:fillRect/>
-          </a:stretch>
-        </p:blipFill>
-        <p:spPr>
-          <a:xfrm>
-            <a:off x="5436096" y="1916832"/>
-            <a:ext cx="3528392" cy="3528392"/>
-          </a:xfrm>
-          <a:prstGeom prst="rect">
-            <a:avLst/>
-          </a:prstGeom>
-        </p:spPr>
-      </p:pic>
-      <p:sp>
-        <p:nvSpPr>
-          <p:cNvPr id="8" name="Title 1"/>
-          <p:cNvSpPr>
-            <a:spLocks noGrp="1"/>
-          </p:cNvSpPr>
-          <p:nvPr>
-            <p:ph type="title"/>
-          </p:nvPr>
-        </p:nvSpPr>
-        <p:spPr/>
-        <p:txBody>
-          <a:bodyPr>
-            <a:normAutofit/>
-          </a:bodyPr>
-          <a:lstStyle/>
-          <a:p>
-            <a:r>
-              <a:rPr lang="nb-NO" sz="5400" dirty="0" err="1">
-                <a:solidFill>
-                  <a:srgbClr val="33EA14"/>
-                </a:solidFill>
-                <a:latin typeface="Courier New" panose="02070309020205020404" pitchFamily="49" charset="0"/>
-                <a:cs typeface="Courier New" panose="02070309020205020404" pitchFamily="49" charset="0"/>
-              </a:rPr>
-              <a:t>w</a:t>
-            </a:r>
-            <a:r>
-              <a:rPr lang="nb-NO" sz="5400" dirty="0" err="1" smtClean="0">
-                <a:solidFill>
-                  <a:srgbClr val="33EA14"/>
-                </a:solidFill>
-                <a:latin typeface="Courier New" panose="02070309020205020404" pitchFamily="49" charset="0"/>
-                <a:cs typeface="Courier New" panose="02070309020205020404" pitchFamily="49" charset="0"/>
-              </a:rPr>
-              <a:t>ant</a:t>
-            </a:r>
-            <a:r>
-              <a:rPr lang="nb-NO" sz="5400" dirty="0" smtClean="0">
-                <a:solidFill>
-                  <a:srgbClr val="33EA14"/>
-                </a:solidFill>
-                <a:latin typeface="Courier New" panose="02070309020205020404" pitchFamily="49" charset="0"/>
-                <a:cs typeface="Courier New" panose="02070309020205020404" pitchFamily="49" charset="0"/>
-              </a:rPr>
-              <a:t> more?</a:t>
-            </a:r>
-            <a:endParaRPr lang="nb-NO" sz="5400" dirty="0">
-              <a:solidFill>
-                <a:srgbClr val="33EA14"/>
-              </a:solidFill>
-              <a:latin typeface="Courier New" panose="02070309020205020404" pitchFamily="49" charset="0"/>
-              <a:cs typeface="Courier New" panose="02070309020205020404" pitchFamily="49" charset="0"/>
-            </a:endParaRPr>
-          </a:p>
-        </p:txBody>
-      </p:sp>
-      <p:sp>
-        <p:nvSpPr>
-          <p:cNvPr id="7" name="Content Placeholder 2"/>
-          <p:cNvSpPr>
-            <a:spLocks noGrp="1"/>
-          </p:cNvSpPr>
-          <p:nvPr>
-            <p:ph idx="1"/>
-          </p:nvPr>
-        </p:nvSpPr>
-        <p:spPr>
-          <a:xfrm>
-            <a:off x="323528" y="1844824"/>
-            <a:ext cx="4968552" cy="4591910"/>
-          </a:xfrm>
-        </p:spPr>
-        <p:txBody>
-          <a:bodyPr vert="horz" lIns="91440" tIns="45720" rIns="91440" bIns="45720" rtlCol="0" anchor="t">
-            <a:normAutofit/>
-          </a:bodyPr>
-          <a:lstStyle/>
-          <a:p>
-            <a:pPr>
-              <a:buFont typeface="Wingdings" panose="05000000000000000000" pitchFamily="2" charset="2"/>
-              <a:buChar char="§"/>
-            </a:pPr>
-            <a:r>
-              <a:rPr lang="nb-NO" sz="2800" dirty="0" smtClean="0">
-                <a:solidFill>
-                  <a:schemeClr val="bg1">
-                    <a:lumMod val="95000"/>
-                  </a:schemeClr>
-                </a:solidFill>
-                <a:latin typeface="Courier New" panose="02070309020205020404" pitchFamily="49" charset="0"/>
-                <a:cs typeface="Courier New" panose="02070309020205020404" pitchFamily="49" charset="0"/>
-              </a:rPr>
-              <a:t>Code </a:t>
-            </a:r>
-            <a:r>
-              <a:rPr lang="nb-NO" sz="2800" dirty="0" err="1" smtClean="0">
-                <a:solidFill>
-                  <a:schemeClr val="bg1">
-                    <a:lumMod val="95000"/>
-                  </a:schemeClr>
-                </a:solidFill>
-                <a:latin typeface="Courier New" panose="02070309020205020404" pitchFamily="49" charset="0"/>
-                <a:cs typeface="Courier New" panose="02070309020205020404" pitchFamily="49" charset="0"/>
-              </a:rPr>
-              <a:t>available</a:t>
-            </a:r>
-            <a:r>
-              <a:rPr lang="nb-NO" sz="2800" dirty="0" smtClean="0">
-                <a:solidFill>
-                  <a:schemeClr val="bg1">
-                    <a:lumMod val="95000"/>
-                  </a:schemeClr>
-                </a:solidFill>
-                <a:latin typeface="Courier New" panose="02070309020205020404" pitchFamily="49" charset="0"/>
-                <a:cs typeface="Courier New" panose="02070309020205020404" pitchFamily="49" charset="0"/>
-              </a:rPr>
-              <a:t> at </a:t>
-            </a:r>
-            <a:r>
-              <a:rPr lang="nb-NO" sz="2800" dirty="0" err="1" smtClean="0">
-                <a:solidFill>
-                  <a:schemeClr val="bg1">
-                    <a:lumMod val="95000"/>
-                  </a:schemeClr>
-                </a:solidFill>
-                <a:latin typeface="Courier New" panose="02070309020205020404" pitchFamily="49" charset="0"/>
-                <a:cs typeface="Courier New" panose="02070309020205020404" pitchFamily="49" charset="0"/>
-              </a:rPr>
-              <a:t>github</a:t>
-            </a:r>
-            <a:r>
-              <a:rPr lang="nb-NO" sz="2800" dirty="0" smtClean="0">
-                <a:solidFill>
-                  <a:schemeClr val="bg1">
-                    <a:lumMod val="95000"/>
-                  </a:schemeClr>
-                </a:solidFill>
-                <a:latin typeface="Courier New" panose="02070309020205020404" pitchFamily="49" charset="0"/>
-                <a:cs typeface="Courier New" panose="02070309020205020404" pitchFamily="49" charset="0"/>
-              </a:rPr>
-              <a:t>, </a:t>
-            </a:r>
-            <a:r>
-              <a:rPr lang="nb-NO" sz="2800" dirty="0">
-                <a:solidFill>
-                  <a:srgbClr val="D99694"/>
-                </a:solidFill>
-                <a:latin typeface="Courier New" panose="02070309020205020404" pitchFamily="49" charset="0"/>
-                <a:cs typeface="Courier New" panose="02070309020205020404" pitchFamily="49" charset="0"/>
-                <a:hlinkClick r:id="rId5"/>
-              </a:rPr>
-              <a:t>https://</a:t>
-            </a:r>
-            <a:r>
-              <a:rPr lang="nb-NO" sz="2800" dirty="0" smtClean="0">
-                <a:solidFill>
-                  <a:srgbClr val="D99694"/>
-                </a:solidFill>
-                <a:latin typeface="Courier New" panose="02070309020205020404" pitchFamily="49" charset="0"/>
-                <a:cs typeface="Courier New" panose="02070309020205020404" pitchFamily="49" charset="0"/>
-                <a:hlinkClick r:id="rId5"/>
-              </a:rPr>
-              <a:t>github.com/magnushg/NodeConfOneShotOslo</a:t>
-            </a:r>
-            <a:endParaRPr lang="nb-NO" sz="2800" dirty="0" smtClean="0">
-              <a:solidFill>
-                <a:srgbClr val="D99694"/>
-              </a:solidFill>
-              <a:latin typeface="Courier New" panose="02070309020205020404" pitchFamily="49" charset="0"/>
-              <a:cs typeface="Courier New" panose="02070309020205020404" pitchFamily="49" charset="0"/>
-            </a:endParaRPr>
-          </a:p>
-          <a:p>
-            <a:pPr>
-              <a:buFont typeface="Wingdings" panose="05000000000000000000" pitchFamily="2" charset="2"/>
-              <a:buChar char="§"/>
-            </a:pPr>
-            <a:r>
-              <a:rPr lang="nb-NO" sz="2800" dirty="0" err="1" smtClean="0">
-                <a:solidFill>
-                  <a:schemeClr val="bg1">
-                    <a:lumMod val="95000"/>
-                  </a:schemeClr>
-                </a:solidFill>
-                <a:latin typeface="Courier New" panose="02070309020205020404" pitchFamily="49" charset="0"/>
-                <a:cs typeface="Courier New" panose="02070309020205020404" pitchFamily="49" charset="0"/>
-              </a:rPr>
-              <a:t>Contact</a:t>
-            </a:r>
-            <a:r>
-              <a:rPr lang="nb-NO" sz="2800" dirty="0" smtClean="0">
-                <a:solidFill>
-                  <a:schemeClr val="bg1">
-                    <a:lumMod val="95000"/>
-                  </a:schemeClr>
-                </a:solidFill>
-                <a:latin typeface="Courier New" panose="02070309020205020404" pitchFamily="49" charset="0"/>
-                <a:cs typeface="Courier New" panose="02070309020205020404" pitchFamily="49" charset="0"/>
-              </a:rPr>
-              <a:t> </a:t>
-            </a:r>
-            <a:r>
-              <a:rPr lang="nb-NO" sz="2800" dirty="0" err="1" smtClean="0">
-                <a:solidFill>
-                  <a:schemeClr val="bg1">
-                    <a:lumMod val="95000"/>
-                  </a:schemeClr>
-                </a:solidFill>
-                <a:latin typeface="Courier New" panose="02070309020205020404" pitchFamily="49" charset="0"/>
-                <a:cs typeface="Courier New" panose="02070309020205020404" pitchFamily="49" charset="0"/>
-              </a:rPr>
-              <a:t>me</a:t>
-            </a:r>
-            <a:r>
-              <a:rPr lang="nb-NO" sz="2800" dirty="0" smtClean="0">
-                <a:solidFill>
-                  <a:schemeClr val="bg1">
-                    <a:lumMod val="95000"/>
-                  </a:schemeClr>
-                </a:solidFill>
-                <a:latin typeface="Courier New" panose="02070309020205020404" pitchFamily="49" charset="0"/>
-                <a:cs typeface="Courier New" panose="02070309020205020404" pitchFamily="49" charset="0"/>
-              </a:rPr>
-              <a:t> at </a:t>
-            </a:r>
-            <a:r>
-              <a:rPr lang="nb-NO" sz="2800" dirty="0">
-                <a:solidFill>
-                  <a:srgbClr val="33EA14"/>
-                </a:solidFill>
-                <a:latin typeface="Courier New" panose="02070309020205020404" pitchFamily="49" charset="0"/>
-                <a:cs typeface="Courier New" panose="02070309020205020404" pitchFamily="49" charset="0"/>
-                <a:hlinkClick r:id="rId6"/>
-              </a:rPr>
-              <a:t>magnus.green@bouvet.no</a:t>
-            </a:r>
-            <a:r>
-              <a:rPr lang="nb-NO" sz="2800" dirty="0" smtClean="0">
-                <a:solidFill>
-                  <a:schemeClr val="bg1">
-                    <a:lumMod val="95000"/>
-                  </a:schemeClr>
-                </a:solidFill>
-                <a:latin typeface="Courier New" panose="02070309020205020404" pitchFamily="49" charset="0"/>
-                <a:cs typeface="Courier New" panose="02070309020205020404" pitchFamily="49" charset="0"/>
-              </a:rPr>
-              <a:t> or @</a:t>
-            </a:r>
-            <a:r>
-              <a:rPr lang="nb-NO" sz="2800" dirty="0" err="1" smtClean="0">
-                <a:solidFill>
-                  <a:schemeClr val="bg1">
-                    <a:lumMod val="95000"/>
-                  </a:schemeClr>
-                </a:solidFill>
-                <a:latin typeface="Courier New" panose="02070309020205020404" pitchFamily="49" charset="0"/>
-                <a:cs typeface="Courier New" panose="02070309020205020404" pitchFamily="49" charset="0"/>
-              </a:rPr>
-              <a:t>magnusg</a:t>
-            </a:r>
-            <a:endParaRPr lang="nb-NO" sz="2800" dirty="0" smtClean="0">
-              <a:solidFill>
-                <a:schemeClr val="bg1">
-                  <a:lumMod val="95000"/>
-                </a:schemeClr>
-              </a:solidFill>
-              <a:latin typeface="Courier New" panose="02070309020205020404" pitchFamily="49" charset="0"/>
-              <a:cs typeface="Courier New" panose="02070309020205020404" pitchFamily="49" charset="0"/>
-            </a:endParaRPr>
-          </a:p>
-          <a:p>
-            <a:pPr>
-              <a:buFont typeface="Wingdings" panose="05000000000000000000" pitchFamily="2" charset="2"/>
-              <a:buChar char="§"/>
-            </a:pPr>
-            <a:endParaRPr lang="nb-NO" sz="3600" dirty="0">
-              <a:solidFill>
-                <a:schemeClr val="bg1">
-                  <a:lumMod val="95000"/>
-                </a:schemeClr>
-              </a:solidFill>
-              <a:latin typeface="Courier New" panose="02070309020205020404" pitchFamily="49" charset="0"/>
-              <a:cs typeface="Courier New" panose="02070309020205020404" pitchFamily="49" charset="0"/>
-            </a:endParaRPr>
-          </a:p>
-          <a:p>
-            <a:pPr>
-              <a:buFont typeface="Wingdings" panose="05000000000000000000" pitchFamily="2" charset="2"/>
-              <a:buChar char="§"/>
-            </a:pPr>
-            <a:endParaRPr lang="nb-NO" sz="3600" dirty="0">
-              <a:solidFill>
-                <a:schemeClr val="bg1">
-                  <a:lumMod val="95000"/>
-                </a:schemeClr>
-              </a:solidFill>
-              <a:latin typeface="Courier New" panose="02070309020205020404" pitchFamily="49" charset="0"/>
-              <a:cs typeface="Courier New" panose="02070309020205020404" pitchFamily="49" charset="0"/>
-            </a:endParaRPr>
-          </a:p>
-        </p:txBody>
-      </p:sp>
     </p:spTree>
     <p:extLst>
       <p:ext uri="{BB962C8B-B14F-4D97-AF65-F5344CB8AC3E}">
-        <p14:creationId xmlns:p14="http://schemas.microsoft.com/office/powerpoint/2010/main" val="1381144338"/>
+        <p14:creationId xmlns:p14="http://schemas.microsoft.com/office/powerpoint/2010/main" val="934765287"/>
       </p:ext>
     </p:extLst>
   </p:cSld>

</xml_diff>